<commit_message>
changed scatter plot to center instead of trend line
</commit_message>
<xml_diff>
--- a/VizPresentation.pptx
+++ b/VizPresentation.pptx
@@ -224,7 +224,7 @@
           <a:p>
             <a:fld id="{68191E66-9368-45D5-8F4A-C5D40DF4CD05}" type="datetimeFigureOut">
               <a:rPr lang="en-US" smtClean="0"/>
-              <a:t>12/21/2021</a:t>
+              <a:t>12/27/2021</a:t>
             </a:fld>
             <a:endParaRPr lang="en-US"/>
           </a:p>
@@ -628,7 +628,7 @@
           <a:bodyPr/>
           <a:lstStyle/>
           <a:p>
-            <a:pPr marL="0" algn="r" defTabSz="914400" rtl="1" eaLnBrk="1" latinLnBrk="0" hangingPunct="1"/>
+            <a:pPr algn="r" rtl="1"/>
             <a:endParaRPr lang="en-IL" dirty="0"/>
           </a:p>
         </p:txBody>
@@ -650,7 +650,7 @@
           <a:p>
             <a:fld id="{55B8F50F-3A61-429B-BAE3-AAAAAFC03A42}" type="slidenum">
               <a:rPr lang="en-US" smtClean="0"/>
-              <a:t>13</a:t>
+              <a:t>10</a:t>
             </a:fld>
             <a:endParaRPr lang="en-US"/>
           </a:p>
@@ -659,7 +659,7 @@
     </p:spTree>
     <p:extLst>
       <p:ext uri="{BB962C8B-B14F-4D97-AF65-F5344CB8AC3E}">
-        <p14:creationId xmlns:p14="http://schemas.microsoft.com/office/powerpoint/2010/main" val="1811507580"/>
+        <p14:creationId xmlns:p14="http://schemas.microsoft.com/office/powerpoint/2010/main" val="2935278922"/>
       </p:ext>
     </p:extLst>
   </p:cSld>
@@ -714,10 +714,371 @@
           <a:lstStyle/>
           <a:p>
             <a:pPr marL="0" algn="r" defTabSz="914400" rtl="1" eaLnBrk="1" latinLnBrk="0" hangingPunct="1"/>
+            <a:endParaRPr lang="en-IL" dirty="0"/>
+          </a:p>
+        </p:txBody>
+      </p:sp>
+      <p:sp>
+        <p:nvSpPr>
+          <p:cNvPr id="4" name="Slide Number Placeholder 3"/>
+          <p:cNvSpPr>
+            <a:spLocks noGrp="1"/>
+          </p:cNvSpPr>
+          <p:nvPr>
+            <p:ph type="sldNum" sz="quarter" idx="5"/>
+          </p:nvPr>
+        </p:nvSpPr>
+        <p:spPr/>
+        <p:txBody>
+          <a:bodyPr/>
+          <a:lstStyle/>
+          <a:p>
+            <a:fld id="{55B8F50F-3A61-429B-BAE3-AAAAAFC03A42}" type="slidenum">
+              <a:rPr lang="en-US" smtClean="0"/>
+              <a:t>11</a:t>
+            </a:fld>
+            <a:endParaRPr lang="en-US"/>
+          </a:p>
+        </p:txBody>
+      </p:sp>
+    </p:spTree>
+    <p:extLst>
+      <p:ext uri="{BB962C8B-B14F-4D97-AF65-F5344CB8AC3E}">
+        <p14:creationId xmlns:p14="http://schemas.microsoft.com/office/powerpoint/2010/main" val="3625994037"/>
+      </p:ext>
+    </p:extLst>
+  </p:cSld>
+  <p:clrMapOvr>
+    <a:masterClrMapping/>
+  </p:clrMapOvr>
+</p:notes>
+</file>
+
+<file path=ppt/notesSlides/notesSlide12.xml><?xml version="1.0" encoding="utf-8"?>
+<p:notes xmlns:a="http://schemas.openxmlformats.org/drawingml/2006/main" xmlns:r="http://schemas.openxmlformats.org/officeDocument/2006/relationships" xmlns:p="http://schemas.openxmlformats.org/presentationml/2006/main">
+  <p:cSld>
+    <p:spTree>
+      <p:nvGrpSpPr>
+        <p:cNvPr id="1" name=""/>
+        <p:cNvGrpSpPr/>
+        <p:nvPr/>
+      </p:nvGrpSpPr>
+      <p:grpSpPr>
+        <a:xfrm>
+          <a:off x="0" y="0"/>
+          <a:ext cx="0" cy="0"/>
+          <a:chOff x="0" y="0"/>
+          <a:chExt cx="0" cy="0"/>
+        </a:xfrm>
+      </p:grpSpPr>
+      <p:sp>
+        <p:nvSpPr>
+          <p:cNvPr id="2" name="Slide Image Placeholder 1"/>
+          <p:cNvSpPr>
+            <a:spLocks noGrp="1" noRot="1" noChangeAspect="1"/>
+          </p:cNvSpPr>
+          <p:nvPr>
+            <p:ph type="sldImg"/>
+          </p:nvPr>
+        </p:nvSpPr>
+        <p:spPr/>
+      </p:sp>
+      <p:sp>
+        <p:nvSpPr>
+          <p:cNvPr id="3" name="Notes Placeholder 2"/>
+          <p:cNvSpPr>
+            <a:spLocks noGrp="1"/>
+          </p:cNvSpPr>
+          <p:nvPr>
+            <p:ph type="body" idx="1"/>
+          </p:nvPr>
+        </p:nvSpPr>
+        <p:spPr/>
+        <p:txBody>
+          <a:bodyPr/>
+          <a:lstStyle/>
+          <a:p>
+            <a:endParaRPr lang="en-US" dirty="0"/>
+          </a:p>
+        </p:txBody>
+      </p:sp>
+      <p:sp>
+        <p:nvSpPr>
+          <p:cNvPr id="4" name="Slide Number Placeholder 3"/>
+          <p:cNvSpPr>
+            <a:spLocks noGrp="1"/>
+          </p:cNvSpPr>
+          <p:nvPr>
+            <p:ph type="sldNum" sz="quarter" idx="5"/>
+          </p:nvPr>
+        </p:nvSpPr>
+        <p:spPr/>
+        <p:txBody>
+          <a:bodyPr/>
+          <a:lstStyle/>
+          <a:p>
+            <a:fld id="{55B8F50F-3A61-429B-BAE3-AAAAAFC03A42}" type="slidenum">
+              <a:rPr lang="en-US" smtClean="0"/>
+              <a:t>12</a:t>
+            </a:fld>
+            <a:endParaRPr lang="en-US"/>
+          </a:p>
+        </p:txBody>
+      </p:sp>
+    </p:spTree>
+    <p:extLst>
+      <p:ext uri="{BB962C8B-B14F-4D97-AF65-F5344CB8AC3E}">
+        <p14:creationId xmlns:p14="http://schemas.microsoft.com/office/powerpoint/2010/main" val="984496985"/>
+      </p:ext>
+    </p:extLst>
+  </p:cSld>
+  <p:clrMapOvr>
+    <a:masterClrMapping/>
+  </p:clrMapOvr>
+</p:notes>
+</file>
+
+<file path=ppt/notesSlides/notesSlide13.xml><?xml version="1.0" encoding="utf-8"?>
+<p:notes xmlns:a="http://schemas.openxmlformats.org/drawingml/2006/main" xmlns:r="http://schemas.openxmlformats.org/officeDocument/2006/relationships" xmlns:p="http://schemas.openxmlformats.org/presentationml/2006/main">
+  <p:cSld>
+    <p:spTree>
+      <p:nvGrpSpPr>
+        <p:cNvPr id="1" name=""/>
+        <p:cNvGrpSpPr/>
+        <p:nvPr/>
+      </p:nvGrpSpPr>
+      <p:grpSpPr>
+        <a:xfrm>
+          <a:off x="0" y="0"/>
+          <a:ext cx="0" cy="0"/>
+          <a:chOff x="0" y="0"/>
+          <a:chExt cx="0" cy="0"/>
+        </a:xfrm>
+      </p:grpSpPr>
+      <p:sp>
+        <p:nvSpPr>
+          <p:cNvPr id="2" name="Slide Image Placeholder 1"/>
+          <p:cNvSpPr>
+            <a:spLocks noGrp="1" noRot="1" noChangeAspect="1"/>
+          </p:cNvSpPr>
+          <p:nvPr>
+            <p:ph type="sldImg"/>
+          </p:nvPr>
+        </p:nvSpPr>
+        <p:spPr/>
+      </p:sp>
+      <p:sp>
+        <p:nvSpPr>
+          <p:cNvPr id="3" name="Notes Placeholder 2"/>
+          <p:cNvSpPr>
+            <a:spLocks noGrp="1"/>
+          </p:cNvSpPr>
+          <p:nvPr>
+            <p:ph type="body" idx="1"/>
+          </p:nvPr>
+        </p:nvSpPr>
+        <p:spPr/>
+        <p:txBody>
+          <a:bodyPr/>
+          <a:lstStyle/>
+          <a:p>
+            <a:pPr algn="r" rtl="1"/>
             <a:r>
               <a:rPr lang="he-IL" dirty="0"/>
-              <a:t>דור</a:t>
-            </a:r>
+              <a:t>מה - מעקב אחר דקות אי ספיקה לפי אזורים שונים. </a:t>
+            </a:r>
+          </a:p>
+          <a:p>
+            <a:pPr algn="r" rtl="1"/>
+            <a:r>
+              <a:rPr lang="he-IL" dirty="0"/>
+              <a:t>למה – הקצאת משאבים רלוונטיים לאזורים שונים.</a:t>
+            </a:r>
+          </a:p>
+          <a:p>
+            <a:pPr algn="r" rtl="1"/>
+            <a:r>
+              <a:rPr lang="he-IL" dirty="0"/>
+              <a:t>איך – </a:t>
+            </a:r>
+            <a:r>
+              <a:rPr lang="en-US" dirty="0"/>
+              <a:t>Radar Plot</a:t>
+            </a:r>
+            <a:endParaRPr lang="en-IL" dirty="0"/>
+          </a:p>
+          <a:p>
+            <a:pPr marL="0" algn="r" defTabSz="914400" rtl="1" eaLnBrk="1" latinLnBrk="0" hangingPunct="1"/>
+            <a:endParaRPr lang="en-IL" dirty="0"/>
+          </a:p>
+        </p:txBody>
+      </p:sp>
+      <p:sp>
+        <p:nvSpPr>
+          <p:cNvPr id="4" name="Slide Number Placeholder 3"/>
+          <p:cNvSpPr>
+            <a:spLocks noGrp="1"/>
+          </p:cNvSpPr>
+          <p:nvPr>
+            <p:ph type="sldNum" sz="quarter" idx="5"/>
+          </p:nvPr>
+        </p:nvSpPr>
+        <p:spPr/>
+        <p:txBody>
+          <a:bodyPr/>
+          <a:lstStyle/>
+          <a:p>
+            <a:fld id="{55B8F50F-3A61-429B-BAE3-AAAAAFC03A42}" type="slidenum">
+              <a:rPr lang="en-US" smtClean="0"/>
+              <a:t>13</a:t>
+            </a:fld>
+            <a:endParaRPr lang="en-US"/>
+          </a:p>
+        </p:txBody>
+      </p:sp>
+    </p:spTree>
+    <p:extLst>
+      <p:ext uri="{BB962C8B-B14F-4D97-AF65-F5344CB8AC3E}">
+        <p14:creationId xmlns:p14="http://schemas.microsoft.com/office/powerpoint/2010/main" val="1811507580"/>
+      </p:ext>
+    </p:extLst>
+  </p:cSld>
+  <p:clrMapOvr>
+    <a:masterClrMapping/>
+  </p:clrMapOvr>
+</p:notes>
+</file>
+
+<file path=ppt/notesSlides/notesSlide14.xml><?xml version="1.0" encoding="utf-8"?>
+<p:notes xmlns:a="http://schemas.openxmlformats.org/drawingml/2006/main" xmlns:r="http://schemas.openxmlformats.org/officeDocument/2006/relationships" xmlns:p="http://schemas.openxmlformats.org/presentationml/2006/main">
+  <p:cSld>
+    <p:spTree>
+      <p:nvGrpSpPr>
+        <p:cNvPr id="1" name=""/>
+        <p:cNvGrpSpPr/>
+        <p:nvPr/>
+      </p:nvGrpSpPr>
+      <p:grpSpPr>
+        <a:xfrm>
+          <a:off x="0" y="0"/>
+          <a:ext cx="0" cy="0"/>
+          <a:chOff x="0" y="0"/>
+          <a:chExt cx="0" cy="0"/>
+        </a:xfrm>
+      </p:grpSpPr>
+      <p:sp>
+        <p:nvSpPr>
+          <p:cNvPr id="2" name="Slide Image Placeholder 1"/>
+          <p:cNvSpPr>
+            <a:spLocks noGrp="1" noRot="1" noChangeAspect="1"/>
+          </p:cNvSpPr>
+          <p:nvPr>
+            <p:ph type="sldImg"/>
+          </p:nvPr>
+        </p:nvSpPr>
+        <p:spPr/>
+      </p:sp>
+      <p:sp>
+        <p:nvSpPr>
+          <p:cNvPr id="3" name="Notes Placeholder 2"/>
+          <p:cNvSpPr>
+            <a:spLocks noGrp="1"/>
+          </p:cNvSpPr>
+          <p:nvPr>
+            <p:ph type="body" idx="1"/>
+          </p:nvPr>
+        </p:nvSpPr>
+        <p:spPr/>
+        <p:txBody>
+          <a:bodyPr/>
+          <a:lstStyle/>
+          <a:p>
+            <a:pPr algn="r" rtl="1"/>
+            <a:endParaRPr lang="en-IL" dirty="0"/>
+          </a:p>
+        </p:txBody>
+      </p:sp>
+      <p:sp>
+        <p:nvSpPr>
+          <p:cNvPr id="4" name="Slide Number Placeholder 3"/>
+          <p:cNvSpPr>
+            <a:spLocks noGrp="1"/>
+          </p:cNvSpPr>
+          <p:nvPr>
+            <p:ph type="sldNum" sz="quarter" idx="5"/>
+          </p:nvPr>
+        </p:nvSpPr>
+        <p:spPr/>
+        <p:txBody>
+          <a:bodyPr/>
+          <a:lstStyle/>
+          <a:p>
+            <a:fld id="{55B8F50F-3A61-429B-BAE3-AAAAAFC03A42}" type="slidenum">
+              <a:rPr lang="en-US" smtClean="0"/>
+              <a:t>14</a:t>
+            </a:fld>
+            <a:endParaRPr lang="en-US"/>
+          </a:p>
+        </p:txBody>
+      </p:sp>
+    </p:spTree>
+    <p:extLst>
+      <p:ext uri="{BB962C8B-B14F-4D97-AF65-F5344CB8AC3E}">
+        <p14:creationId xmlns:p14="http://schemas.microsoft.com/office/powerpoint/2010/main" val="574904029"/>
+      </p:ext>
+    </p:extLst>
+  </p:cSld>
+  <p:clrMapOvr>
+    <a:masterClrMapping/>
+  </p:clrMapOvr>
+</p:notes>
+</file>
+
+<file path=ppt/notesSlides/notesSlide15.xml><?xml version="1.0" encoding="utf-8"?>
+<p:notes xmlns:a="http://schemas.openxmlformats.org/drawingml/2006/main" xmlns:r="http://schemas.openxmlformats.org/officeDocument/2006/relationships" xmlns:p="http://schemas.openxmlformats.org/presentationml/2006/main">
+  <p:cSld>
+    <p:spTree>
+      <p:nvGrpSpPr>
+        <p:cNvPr id="1" name=""/>
+        <p:cNvGrpSpPr/>
+        <p:nvPr/>
+      </p:nvGrpSpPr>
+      <p:grpSpPr>
+        <a:xfrm>
+          <a:off x="0" y="0"/>
+          <a:ext cx="0" cy="0"/>
+          <a:chOff x="0" y="0"/>
+          <a:chExt cx="0" cy="0"/>
+        </a:xfrm>
+      </p:grpSpPr>
+      <p:sp>
+        <p:nvSpPr>
+          <p:cNvPr id="2" name="Slide Image Placeholder 1"/>
+          <p:cNvSpPr>
+            <a:spLocks noGrp="1" noRot="1" noChangeAspect="1"/>
+          </p:cNvSpPr>
+          <p:nvPr>
+            <p:ph type="sldImg"/>
+          </p:nvPr>
+        </p:nvSpPr>
+        <p:spPr/>
+      </p:sp>
+      <p:sp>
+        <p:nvSpPr>
+          <p:cNvPr id="3" name="Notes Placeholder 2"/>
+          <p:cNvSpPr>
+            <a:spLocks noGrp="1"/>
+          </p:cNvSpPr>
+          <p:nvPr>
+            <p:ph type="body" idx="1"/>
+          </p:nvPr>
+        </p:nvSpPr>
+        <p:spPr/>
+        <p:txBody>
+          <a:bodyPr/>
+          <a:lstStyle/>
+          <a:p>
+            <a:pPr marL="0" algn="r" defTabSz="914400" rtl="1" eaLnBrk="1" latinLnBrk="0" hangingPunct="1"/>
             <a:endParaRPr lang="en-US" dirty="0"/>
           </a:p>
         </p:txBody>
@@ -803,6 +1164,10 @@
           <a:lstStyle/>
           <a:p>
             <a:pPr algn="r" rtl="1"/>
+            <a:r>
+              <a:rPr lang="he-IL" dirty="0"/>
+              <a:t>קורדובה- הצגת המידע</a:t>
+            </a:r>
             <a:endParaRPr lang="en-IL" dirty="0"/>
           </a:p>
         </p:txBody>
@@ -888,6 +1253,35 @@
           <a:lstStyle/>
           <a:p>
             <a:pPr marL="0" algn="r" defTabSz="914400" rtl="1" eaLnBrk="1" latinLnBrk="0" hangingPunct="1"/>
+            <a:r>
+              <a:rPr lang="he-IL" dirty="0"/>
+              <a:t>קורדובה – גרפים קודמים</a:t>
+            </a:r>
+          </a:p>
+          <a:p>
+            <a:pPr marL="0" algn="r" defTabSz="914400" rtl="1" eaLnBrk="1" latinLnBrk="0" hangingPunct="1"/>
+            <a:r>
+              <a:rPr lang="he-IL" dirty="0"/>
+              <a:t>גרף שמאלי עליון התפלגות היצור בשעות לפי סוגי דלקים – לא אינפורמטיבי מספיק.</a:t>
+            </a:r>
+          </a:p>
+          <a:p>
+            <a:pPr marL="0" algn="r" defTabSz="914400" rtl="1" eaLnBrk="1" latinLnBrk="0" hangingPunct="1"/>
+            <a:endParaRPr lang="he-IL" dirty="0"/>
+          </a:p>
+          <a:p>
+            <a:pPr marL="0" algn="r" defTabSz="914400" rtl="1" eaLnBrk="1" latinLnBrk="0" hangingPunct="1"/>
+            <a:r>
+              <a:rPr lang="he-IL" dirty="0"/>
+              <a:t>גרף ימני עליון – גרפי העוגה משויכים לשנה אחת, קשה להבין מהגרף האם קיימות מגמות התייעלות.</a:t>
+            </a:r>
+          </a:p>
+          <a:p>
+            <a:pPr marL="0" algn="r" defTabSz="914400" rtl="1" eaLnBrk="1" latinLnBrk="0" hangingPunct="1"/>
+            <a:endParaRPr lang="he-IL" dirty="0"/>
+          </a:p>
+          <a:p>
+            <a:pPr marL="0" algn="r" defTabSz="914400" rtl="1" eaLnBrk="1" latinLnBrk="0" hangingPunct="1"/>
             <a:endParaRPr lang="en-US" dirty="0"/>
           </a:p>
         </p:txBody>
@@ -972,7 +1366,27 @@
           <a:bodyPr/>
           <a:lstStyle/>
           <a:p>
-            <a:pPr marL="0" algn="r" defTabSz="914400" rtl="1" eaLnBrk="1" latinLnBrk="0" hangingPunct="1"/>
+            <a:pPr algn="r" rtl="1"/>
+            <a:r>
+              <a:rPr lang="he-IL" dirty="0"/>
+              <a:t>קורדובה – כל </a:t>
+            </a:r>
+            <a:r>
+              <a:rPr lang="he-IL" dirty="0" err="1"/>
+              <a:t>הויזואלזציות</a:t>
+            </a:r>
+            <a:r>
+              <a:rPr lang="he-IL" dirty="0"/>
+              <a:t> נעשו עם כלי פייטון </a:t>
+            </a:r>
+            <a:r>
+              <a:rPr lang="he-IL" dirty="0" err="1"/>
+              <a:t>ומאטלאב</a:t>
+            </a:r>
+            <a:r>
+              <a:rPr lang="he-IL" dirty="0"/>
+              <a:t>.</a:t>
+            </a:r>
             <a:endParaRPr lang="en-IL" dirty="0"/>
           </a:p>
         </p:txBody>
@@ -994,7 +1408,7 @@
           <a:p>
             <a:fld id="{55B8F50F-3A61-429B-BAE3-AAAAAFC03A42}" type="slidenum">
               <a:rPr lang="en-US" smtClean="0"/>
-              <a:t>5</a:t>
+              <a:t>4</a:t>
             </a:fld>
             <a:endParaRPr lang="en-US"/>
           </a:p>
@@ -1003,7 +1417,7 @@
     </p:spTree>
     <p:extLst>
       <p:ext uri="{BB962C8B-B14F-4D97-AF65-F5344CB8AC3E}">
-        <p14:creationId xmlns:p14="http://schemas.microsoft.com/office/powerpoint/2010/main" val="357343935"/>
+        <p14:creationId xmlns:p14="http://schemas.microsoft.com/office/powerpoint/2010/main" val="2779378681"/>
       </p:ext>
     </p:extLst>
   </p:cSld>
@@ -1058,6 +1472,50 @@
           <a:lstStyle/>
           <a:p>
             <a:pPr marL="0" algn="r" defTabSz="914400" rtl="1" eaLnBrk="1" latinLnBrk="0" hangingPunct="1"/>
+            <a:r>
+              <a:rPr lang="he-IL" dirty="0"/>
+              <a:t>איתי:</a:t>
+            </a:r>
+          </a:p>
+          <a:p>
+            <a:pPr marL="0" algn="r" defTabSz="914400" rtl="1" eaLnBrk="1" latinLnBrk="0" hangingPunct="1"/>
+            <a:r>
+              <a:rPr lang="he-IL" dirty="0"/>
+              <a:t>מה – פוטנציאל היצור </a:t>
+            </a:r>
+            <a:r>
+              <a:rPr lang="he-IL" dirty="0" err="1"/>
+              <a:t>החמשלי</a:t>
+            </a:r>
+            <a:r>
+              <a:rPr lang="he-IL" dirty="0"/>
+              <a:t> מאנרגיה סולארית כתלות בביקוש.</a:t>
+            </a:r>
+          </a:p>
+          <a:p>
+            <a:pPr marL="0" algn="r" defTabSz="914400" rtl="1" eaLnBrk="1" latinLnBrk="0" hangingPunct="1"/>
+            <a:r>
+              <a:rPr lang="he-IL" dirty="0"/>
+              <a:t>למה – ככלי עזר לקבלת החלטות עלות תועלת של יצור אנרגיה סולארית.</a:t>
+            </a:r>
+          </a:p>
+          <a:p>
+            <a:pPr marL="0" algn="r" defTabSz="914400" rtl="1" eaLnBrk="1" latinLnBrk="0" hangingPunct="1"/>
+            <a:r>
+              <a:rPr lang="he-IL" dirty="0"/>
+              <a:t>איך – גרף </a:t>
+            </a:r>
+            <a:r>
+              <a:rPr lang="he-IL" dirty="0" err="1"/>
+              <a:t>אינטרקטיבי</a:t>
+            </a:r>
+            <a:r>
+              <a:rPr lang="he-IL" dirty="0"/>
+              <a:t> של ביקוש אל מול פוטנציאל סולארי.</a:t>
+            </a:r>
+          </a:p>
+          <a:p>
+            <a:pPr marL="0" algn="r" defTabSz="914400" rtl="1" eaLnBrk="1" latinLnBrk="0" hangingPunct="1"/>
             <a:endParaRPr lang="en-IL" dirty="0"/>
           </a:p>
         </p:txBody>
@@ -1079,7 +1537,7 @@
           <a:p>
             <a:fld id="{55B8F50F-3A61-429B-BAE3-AAAAAFC03A42}" type="slidenum">
               <a:rPr lang="en-US" smtClean="0"/>
-              <a:t>6</a:t>
+              <a:t>5</a:t>
             </a:fld>
             <a:endParaRPr lang="en-US"/>
           </a:p>
@@ -1088,7 +1546,7 @@
     </p:spTree>
     <p:extLst>
       <p:ext uri="{BB962C8B-B14F-4D97-AF65-F5344CB8AC3E}">
-        <p14:creationId xmlns:p14="http://schemas.microsoft.com/office/powerpoint/2010/main" val="1774851178"/>
+        <p14:creationId xmlns:p14="http://schemas.microsoft.com/office/powerpoint/2010/main" val="357343935"/>
       </p:ext>
     </p:extLst>
   </p:cSld>
@@ -1143,6 +1601,58 @@
           <a:lstStyle/>
           <a:p>
             <a:pPr marL="0" algn="r" defTabSz="914400" rtl="1" eaLnBrk="1" latinLnBrk="0" hangingPunct="1"/>
+            <a:r>
+              <a:rPr lang="he-IL" dirty="0"/>
+              <a:t>איתי – </a:t>
+            </a:r>
+          </a:p>
+          <a:p>
+            <a:pPr marL="0" algn="r" defTabSz="914400" rtl="1" eaLnBrk="1" latinLnBrk="0" hangingPunct="1"/>
+            <a:r>
+              <a:rPr lang="he-IL" dirty="0"/>
+              <a:t>מה - שינוי התפלגויות צריכת החשמל של </a:t>
+            </a:r>
+            <a:r>
+              <a:rPr lang="he-IL" dirty="0" err="1"/>
+              <a:t>סקטורי</a:t>
+            </a:r>
+            <a:r>
+              <a:rPr lang="he-IL" dirty="0"/>
+              <a:t> צריכה שונים</a:t>
+            </a:r>
+          </a:p>
+          <a:p>
+            <a:pPr marL="0" algn="r" defTabSz="914400" rtl="1" eaLnBrk="1" latinLnBrk="0" hangingPunct="1"/>
+            <a:r>
+              <a:rPr lang="he-IL" dirty="0"/>
+              <a:t>למה – אנחנו רוצים לדעת אילו סקטורים מתייעלים, תוך כדי הבנת הסקטורים המשמעותיים ביותר.</a:t>
+            </a:r>
+          </a:p>
+          <a:p>
+            <a:pPr marL="0" algn="r" defTabSz="914400" rtl="1" eaLnBrk="1" latinLnBrk="0" hangingPunct="1"/>
+            <a:r>
+              <a:rPr lang="he-IL" dirty="0"/>
+              <a:t>איך גרף </a:t>
+            </a:r>
+            <a:r>
+              <a:rPr lang="he-IL" dirty="0" err="1"/>
+              <a:t>אינטרקטיבי</a:t>
+            </a:r>
+            <a:r>
+              <a:rPr lang="he-IL" dirty="0"/>
+              <a:t>, </a:t>
+            </a:r>
+            <a:r>
+              <a:rPr lang="he-IL" dirty="0" err="1"/>
+              <a:t>סטאק</a:t>
+            </a:r>
+            <a:r>
+              <a:rPr lang="he-IL" dirty="0"/>
+              <a:t> מול דינאמי.</a:t>
+            </a:r>
+          </a:p>
+          <a:p>
+            <a:pPr marL="0" algn="r" defTabSz="914400" rtl="1" eaLnBrk="1" latinLnBrk="0" hangingPunct="1"/>
             <a:endParaRPr lang="en-IL" dirty="0"/>
           </a:p>
         </p:txBody>
@@ -1164,7 +1674,7 @@
           <a:p>
             <a:fld id="{55B8F50F-3A61-429B-BAE3-AAAAAFC03A42}" type="slidenum">
               <a:rPr lang="en-US" smtClean="0"/>
-              <a:t>7</a:t>
+              <a:t>6</a:t>
             </a:fld>
             <a:endParaRPr lang="en-US"/>
           </a:p>
@@ -1173,7 +1683,7 @@
     </p:spTree>
     <p:extLst>
       <p:ext uri="{BB962C8B-B14F-4D97-AF65-F5344CB8AC3E}">
-        <p14:creationId xmlns:p14="http://schemas.microsoft.com/office/powerpoint/2010/main" val="4016079019"/>
+        <p14:creationId xmlns:p14="http://schemas.microsoft.com/office/powerpoint/2010/main" val="1774851178"/>
       </p:ext>
     </p:extLst>
   </p:cSld>
@@ -1227,6 +1737,35 @@
           <a:bodyPr/>
           <a:lstStyle/>
           <a:p>
+            <a:pPr algn="r" rtl="1"/>
+            <a:r>
+              <a:rPr lang="he-IL" dirty="0"/>
+              <a:t>מה – הצגה בין שנתית, של פוטנציאל היצור הסולארי אל מול הייצור בפועל.</a:t>
+            </a:r>
+          </a:p>
+          <a:p>
+            <a:pPr algn="r" rtl="1"/>
+            <a:r>
+              <a:rPr lang="he-IL" dirty="0"/>
+              <a:t>למה – השוואה בין שנתית רדודה, מאפשר "הרבה" הסברים חלופיים – לדוגמא – "בשנת 2019 היה פחות שמש".</a:t>
+            </a:r>
+          </a:p>
+          <a:p>
+            <a:pPr algn="r" rtl="1"/>
+            <a:r>
+              <a:rPr lang="he-IL" dirty="0"/>
+              <a:t>איך – </a:t>
+            </a:r>
+            <a:r>
+              <a:rPr lang="he-IL" dirty="0" err="1"/>
+              <a:t>סקאטר</a:t>
+            </a:r>
+            <a:r>
+              <a:rPr lang="he-IL" dirty="0"/>
+              <a:t> פלוט של פוטנציאל מול יצור לכל חודש רלוונטי, תוך הוספת קווי מגמה שנתיים שידגישו את השיפור הבין שנתי.</a:t>
+            </a:r>
+          </a:p>
+          <a:p>
             <a:pPr marL="0" algn="r" defTabSz="914400" rtl="1" eaLnBrk="1" latinLnBrk="0" hangingPunct="1"/>
             <a:endParaRPr lang="en-IL" dirty="0"/>
           </a:p>
@@ -1249,7 +1788,7 @@
           <a:p>
             <a:fld id="{55B8F50F-3A61-429B-BAE3-AAAAAFC03A42}" type="slidenum">
               <a:rPr lang="en-US" smtClean="0"/>
-              <a:t>9</a:t>
+              <a:t>7</a:t>
             </a:fld>
             <a:endParaRPr lang="en-US"/>
           </a:p>
@@ -1258,7 +1797,7 @@
     </p:spTree>
     <p:extLst>
       <p:ext uri="{BB962C8B-B14F-4D97-AF65-F5344CB8AC3E}">
-        <p14:creationId xmlns:p14="http://schemas.microsoft.com/office/powerpoint/2010/main" val="242862108"/>
+        <p14:creationId xmlns:p14="http://schemas.microsoft.com/office/powerpoint/2010/main" val="4016079019"/>
       </p:ext>
     </p:extLst>
   </p:cSld>
@@ -1312,7 +1851,7 @@
           <a:bodyPr/>
           <a:lstStyle/>
           <a:p>
-            <a:pPr marL="0" algn="r" defTabSz="914400" rtl="1" eaLnBrk="1" latinLnBrk="0" hangingPunct="1"/>
+            <a:pPr algn="r" rtl="1"/>
             <a:endParaRPr lang="en-IL" dirty="0"/>
           </a:p>
         </p:txBody>
@@ -1334,7 +1873,7 @@
           <a:p>
             <a:fld id="{55B8F50F-3A61-429B-BAE3-AAAAAFC03A42}" type="slidenum">
               <a:rPr lang="en-US" smtClean="0"/>
-              <a:t>11</a:t>
+              <a:t>8</a:t>
             </a:fld>
             <a:endParaRPr lang="en-US"/>
           </a:p>
@@ -1343,7 +1882,7 @@
     </p:spTree>
     <p:extLst>
       <p:ext uri="{BB962C8B-B14F-4D97-AF65-F5344CB8AC3E}">
-        <p14:creationId xmlns:p14="http://schemas.microsoft.com/office/powerpoint/2010/main" val="3625994037"/>
+        <p14:creationId xmlns:p14="http://schemas.microsoft.com/office/powerpoint/2010/main" val="2714902657"/>
       </p:ext>
     </p:extLst>
   </p:cSld>
@@ -1397,7 +1936,53 @@
           <a:bodyPr/>
           <a:lstStyle/>
           <a:p>
-            <a:endParaRPr lang="en-US" dirty="0"/>
+            <a:pPr algn="r" rtl="1"/>
+            <a:r>
+              <a:rPr lang="he-IL" dirty="0"/>
+              <a:t>מה – לצפות בשונות ביצור החשמל לפי חודשי השנה.</a:t>
+            </a:r>
+          </a:p>
+          <a:p>
+            <a:pPr algn="r" rtl="1"/>
+            <a:r>
+              <a:rPr lang="he-IL" dirty="0"/>
+              <a:t>למה – תכנון לייצור חשמל- פתיחה וסגירה של תחנות כוח,  נעשה על פי ה-"</a:t>
+            </a:r>
+            <a:r>
+              <a:rPr lang="he-IL" dirty="0" err="1"/>
+              <a:t>פיקים</a:t>
+            </a:r>
+            <a:r>
+              <a:rPr lang="he-IL" dirty="0"/>
+              <a:t>" כלומר מקסימום היצור, לכן השונות התוך חודשית היא </a:t>
+            </a:r>
+            <a:r>
+              <a:rPr lang="he-IL" dirty="0" err="1"/>
+              <a:t>אמד</a:t>
+            </a:r>
+            <a:r>
+              <a:rPr lang="he-IL" dirty="0"/>
+              <a:t> מעולה לתכנון עתידי.</a:t>
+            </a:r>
+          </a:p>
+          <a:p>
+            <a:pPr algn="r" rtl="1"/>
+            <a:r>
+              <a:rPr lang="he-IL" dirty="0"/>
+              <a:t>איך – גרף </a:t>
+            </a:r>
+            <a:r>
+              <a:rPr lang="he-IL" dirty="0" err="1"/>
+              <a:t>בוקספלוט</a:t>
+            </a:r>
+            <a:r>
+              <a:rPr lang="he-IL" dirty="0"/>
+              <a:t> לפי פיזור חודשי.</a:t>
+            </a:r>
+          </a:p>
+          <a:p>
+            <a:pPr marL="0" algn="r" defTabSz="914400" rtl="1" eaLnBrk="1" latinLnBrk="0" hangingPunct="1"/>
+            <a:endParaRPr lang="en-IL" dirty="0"/>
           </a:p>
         </p:txBody>
       </p:sp>
@@ -1418,7 +2003,7 @@
           <a:p>
             <a:fld id="{55B8F50F-3A61-429B-BAE3-AAAAAFC03A42}" type="slidenum">
               <a:rPr lang="en-US" smtClean="0"/>
-              <a:t>12</a:t>
+              <a:t>9</a:t>
             </a:fld>
             <a:endParaRPr lang="en-US"/>
           </a:p>
@@ -1427,7 +2012,7 @@
     </p:spTree>
     <p:extLst>
       <p:ext uri="{BB962C8B-B14F-4D97-AF65-F5344CB8AC3E}">
-        <p14:creationId xmlns:p14="http://schemas.microsoft.com/office/powerpoint/2010/main" val="984496985"/>
+        <p14:creationId xmlns:p14="http://schemas.microsoft.com/office/powerpoint/2010/main" val="242862108"/>
       </p:ext>
     </p:extLst>
   </p:cSld>
@@ -1605,7 +2190,7 @@
           <a:p>
             <a:fld id="{0B89DFB9-BC04-4510-B8E3-280922F02B92}" type="datetime1">
               <a:rPr lang="en-US" smtClean="0"/>
-              <a:t>12/21/2021</a:t>
+              <a:t>12/27/2021</a:t>
             </a:fld>
             <a:endParaRPr lang="en-US"/>
           </a:p>
@@ -1833,7 +2418,7 @@
           <a:p>
             <a:fld id="{E4AB2EB2-A161-487C-9E14-3EC500DC3FD4}" type="datetime1">
               <a:rPr lang="en-US" smtClean="0"/>
-              <a:t>12/21/2021</a:t>
+              <a:t>12/27/2021</a:t>
             </a:fld>
             <a:endParaRPr lang="en-US"/>
           </a:p>
@@ -2013,7 +2598,7 @@
           <a:p>
             <a:fld id="{47CFEE15-4EDC-4E2B-9412-6C140B50E1D1}" type="datetime1">
               <a:rPr lang="en-US" smtClean="0"/>
-              <a:t>12/21/2021</a:t>
+              <a:t>12/27/2021</a:t>
             </a:fld>
             <a:endParaRPr lang="en-US"/>
           </a:p>
@@ -2183,7 +2768,7 @@
           <a:p>
             <a:fld id="{E4F90B62-A61E-4712-8E28-538CFE8D8F20}" type="datetime1">
               <a:rPr lang="en-US" smtClean="0"/>
-              <a:t>12/21/2021</a:t>
+              <a:t>12/27/2021</a:t>
             </a:fld>
             <a:endParaRPr lang="en-US"/>
           </a:p>
@@ -2437,7 +3022,7 @@
           <a:p>
             <a:fld id="{3500F20B-5CEC-4585-86D0-FACF098009F2}" type="datetime1">
               <a:rPr lang="en-US" smtClean="0"/>
-              <a:t>12/21/2021</a:t>
+              <a:t>12/27/2021</a:t>
             </a:fld>
             <a:endParaRPr lang="en-US"/>
           </a:p>
@@ -2763,7 +3348,7 @@
           <a:p>
             <a:fld id="{3881879C-12D8-4053-8EA5-8587A1A5171D}" type="datetime1">
               <a:rPr lang="en-US" smtClean="0"/>
-              <a:t>12/21/2021</a:t>
+              <a:t>12/27/2021</a:t>
             </a:fld>
             <a:endParaRPr lang="en-US"/>
           </a:p>
@@ -3214,7 +3799,7 @@
           <a:p>
             <a:fld id="{3877C752-E583-4D59-AAB4-9557FB1AF781}" type="datetime1">
               <a:rPr lang="en-US" smtClean="0"/>
-              <a:t>12/21/2021</a:t>
+              <a:t>12/27/2021</a:t>
             </a:fld>
             <a:endParaRPr lang="en-US"/>
           </a:p>
@@ -3332,7 +3917,7 @@
           <a:p>
             <a:fld id="{F5033136-FA44-4E0B-83E6-3A3BA02100BE}" type="datetime1">
               <a:rPr lang="en-US" smtClean="0"/>
-              <a:t>12/21/2021</a:t>
+              <a:t>12/27/2021</a:t>
             </a:fld>
             <a:endParaRPr lang="en-US"/>
           </a:p>
@@ -3427,7 +4012,7 @@
           <a:p>
             <a:fld id="{53FDD137-81D8-4327-8DB0-831A28A21D5E}" type="datetime1">
               <a:rPr lang="en-US" smtClean="0"/>
-              <a:t>12/21/2021</a:t>
+              <a:t>12/27/2021</a:t>
             </a:fld>
             <a:endParaRPr lang="en-US"/>
           </a:p>
@@ -3714,7 +4299,7 @@
           <a:p>
             <a:fld id="{37332414-7129-4AE4-91EE-3FA83E43B46A}" type="datetime1">
               <a:rPr lang="en-US" smtClean="0"/>
-              <a:t>12/21/2021</a:t>
+              <a:t>12/27/2021</a:t>
             </a:fld>
             <a:endParaRPr lang="en-US"/>
           </a:p>
@@ -4036,7 +4621,7 @@
           <a:p>
             <a:fld id="{6EA5B5ED-2373-4B07-A909-0E75382865B3}" type="datetime1">
               <a:rPr lang="en-US" smtClean="0"/>
-              <a:t>12/21/2021</a:t>
+              <a:t>12/27/2021</a:t>
             </a:fld>
             <a:endParaRPr lang="en-US"/>
           </a:p>
@@ -4290,7 +4875,7 @@
           <a:p>
             <a:fld id="{B5A1F0E7-489D-48A5-960B-C607293C7B07}" type="datetime1">
               <a:rPr lang="en-US" smtClean="0"/>
-              <a:t>12/21/2021</a:t>
+              <a:t>12/27/2021</a:t>
             </a:fld>
             <a:endParaRPr lang="en-US"/>
           </a:p>
@@ -4972,7 +5557,7 @@
           <p:nvPr/>
         </p:nvPicPr>
         <p:blipFill rotWithShape="1">
-          <a:blip r:embed="rId2">
+          <a:blip r:embed="rId3">
             <a:extLst>
               <a:ext uri="{28A0092B-C50C-407E-A947-70E740481C1C}">
                 <a14:useLocalDpi xmlns:a14="http://schemas.microsoft.com/office/drawing/2010/main" val="0"/>
@@ -5014,7 +5599,7 @@
 </file>
 
 <file path=ppt/slides/slide11.xml><?xml version="1.0" encoding="utf-8"?>
-<p:sld xmlns:a="http://schemas.openxmlformats.org/drawingml/2006/main" xmlns:r="http://schemas.openxmlformats.org/officeDocument/2006/relationships" xmlns:p="http://schemas.openxmlformats.org/presentationml/2006/main">
+<p:sld xmlns:a="http://schemas.openxmlformats.org/drawingml/2006/main" xmlns:r="http://schemas.openxmlformats.org/officeDocument/2006/relationships" xmlns:p="http://schemas.openxmlformats.org/presentationml/2006/main" show="0">
   <p:cSld>
     <p:spTree>
       <p:nvGrpSpPr>
@@ -5439,7 +6024,7 @@
 </file>
 
 <file path=ppt/slides/slide12.xml><?xml version="1.0" encoding="utf-8"?>
-<p:sld xmlns:a="http://schemas.openxmlformats.org/drawingml/2006/main" xmlns:r="http://schemas.openxmlformats.org/officeDocument/2006/relationships" xmlns:p="http://schemas.openxmlformats.org/presentationml/2006/main">
+<p:sld xmlns:a="http://schemas.openxmlformats.org/drawingml/2006/main" xmlns:r="http://schemas.openxmlformats.org/officeDocument/2006/relationships" xmlns:p="http://schemas.openxmlformats.org/presentationml/2006/main" show="0">
   <p:cSld>
     <p:spTree>
       <p:nvGrpSpPr>
@@ -5587,7 +6172,7 @@
           <a:p>
             <a:r>
               <a:rPr lang="en-US" dirty="0"/>
-              <a:t>New Visualizations - 6</a:t>
+              <a:t>New Visualizations - 5</a:t>
             </a:r>
           </a:p>
         </p:txBody>
@@ -6030,7 +6615,7 @@
           <p:nvPr/>
         </p:nvPicPr>
         <p:blipFill>
-          <a:blip r:embed="rId2">
+          <a:blip r:embed="rId3">
             <a:extLst>
               <a:ext uri="{28A0092B-C50C-407E-A947-70E740481C1C}">
                 <a14:useLocalDpi xmlns:a14="http://schemas.microsoft.com/office/drawing/2010/main" val="0"/>
@@ -6081,7 +6666,7 @@
           <a:p>
             <a:r>
               <a:rPr lang="en-US" sz="2800" dirty="0">
-                <a:hlinkClick r:id="rId3"/>
+                <a:hlinkClick r:id="rId4" action="ppaction://hlinkfile"/>
               </a:rPr>
               <a:t>Link to interactivity</a:t>
             </a:r>
@@ -7755,7 +8340,7 @@
           <p:nvPr/>
         </p:nvPicPr>
         <p:blipFill>
-          <a:blip r:embed="rId2">
+          <a:blip r:embed="rId3">
             <a:extLst>
               <a:ext uri="{28A0092B-C50C-407E-A947-70E740481C1C}">
                 <a14:useLocalDpi xmlns:a14="http://schemas.microsoft.com/office/drawing/2010/main" val="0"/>
@@ -7802,7 +8387,7 @@
           <p:nvPr/>
         </p:nvPicPr>
         <p:blipFill>
-          <a:blip r:embed="rId3">
+          <a:blip r:embed="rId4">
             <a:extLst>
               <a:ext uri="{28A0092B-C50C-407E-A947-70E740481C1C}">
                 <a14:useLocalDpi xmlns:a14="http://schemas.microsoft.com/office/drawing/2010/main" val="0"/>
@@ -9221,7 +9806,7 @@
           <p:nvPr/>
         </p:nvPicPr>
         <p:blipFill rotWithShape="1">
-          <a:blip r:embed="rId2" cstate="print">
+          <a:blip r:embed="rId3" cstate="print">
             <a:extLst>
               <a:ext uri="{28A0092B-C50C-407E-A947-70E740481C1C}">
                 <a14:useLocalDpi xmlns:a14="http://schemas.microsoft.com/office/drawing/2010/main" val="0"/>

</xml_diff>